<commit_message>
Modifiche a lez. su SSL e su PKI
</commit_message>
<xml_diff>
--- a/slides/ch13-PKI-and-Key-distribution-2020.pptx
+++ b/slides/ch13-PKI-and-Key-distribution-2020.pptx
@@ -132,6 +132,11 @@
       </a:defRPr>
     </a:lvl9pPr>
   </p:defaultTextStyle>
+  <p:extLst>
+    <p:ext uri="{EFAFB233-063F-42B5-8137-9DF3F51BA10A}">
+      <p15:sldGuideLst xmlns:p15="http://schemas.microsoft.com/office/powerpoint/2012/main"/>
+    </p:ext>
+  </p:extLst>
 </p:presentation>
 </file>
 
@@ -325,7 +330,7 @@
           <a:p>
             <a:fld id="{762CD6BD-7546-4E5B-AEEF-17BA2030D417}" type="datetimeFigureOut">
               <a:rPr lang="it-IT" smtClean="0"/>
-              <a:t>20/10/2020</a:t>
+              <a:t>21/10/2020</a:t>
             </a:fld>
             <a:endParaRPr lang="it-IT"/>
           </a:p>
@@ -3089,7 +3094,7 @@
           <a:p>
             <a:fld id="{DD268F46-A143-4D49-98F9-74B8259B3C7B}" type="datetimeFigureOut">
               <a:rPr lang="it-IT" smtClean="0"/>
-              <a:t>20/10/2020</a:t>
+              <a:t>21/10/2020</a:t>
             </a:fld>
             <a:endParaRPr lang="it-IT"/>
           </a:p>
@@ -3289,7 +3294,7 @@
           <a:p>
             <a:fld id="{DD268F46-A143-4D49-98F9-74B8259B3C7B}" type="datetimeFigureOut">
               <a:rPr lang="it-IT" smtClean="0"/>
-              <a:t>20/10/2020</a:t>
+              <a:t>21/10/2020</a:t>
             </a:fld>
             <a:endParaRPr lang="it-IT"/>
           </a:p>
@@ -3499,7 +3504,7 @@
           <a:p>
             <a:fld id="{DD268F46-A143-4D49-98F9-74B8259B3C7B}" type="datetimeFigureOut">
               <a:rPr lang="it-IT" smtClean="0"/>
-              <a:t>20/10/2020</a:t>
+              <a:t>21/10/2020</a:t>
             </a:fld>
             <a:endParaRPr lang="it-IT"/>
           </a:p>
@@ -3699,7 +3704,7 @@
           <a:p>
             <a:fld id="{DD268F46-A143-4D49-98F9-74B8259B3C7B}" type="datetimeFigureOut">
               <a:rPr lang="it-IT" smtClean="0"/>
-              <a:t>20/10/2020</a:t>
+              <a:t>21/10/2020</a:t>
             </a:fld>
             <a:endParaRPr lang="it-IT"/>
           </a:p>
@@ -3975,7 +3980,7 @@
           <a:p>
             <a:fld id="{DD268F46-A143-4D49-98F9-74B8259B3C7B}" type="datetimeFigureOut">
               <a:rPr lang="it-IT" smtClean="0"/>
-              <a:t>20/10/2020</a:t>
+              <a:t>21/10/2020</a:t>
             </a:fld>
             <a:endParaRPr lang="it-IT"/>
           </a:p>
@@ -4243,7 +4248,7 @@
           <a:p>
             <a:fld id="{DD268F46-A143-4D49-98F9-74B8259B3C7B}" type="datetimeFigureOut">
               <a:rPr lang="it-IT" smtClean="0"/>
-              <a:t>20/10/2020</a:t>
+              <a:t>21/10/2020</a:t>
             </a:fld>
             <a:endParaRPr lang="it-IT"/>
           </a:p>
@@ -4658,7 +4663,7 @@
           <a:p>
             <a:fld id="{DD268F46-A143-4D49-98F9-74B8259B3C7B}" type="datetimeFigureOut">
               <a:rPr lang="it-IT" smtClean="0"/>
-              <a:t>20/10/2020</a:t>
+              <a:t>21/10/2020</a:t>
             </a:fld>
             <a:endParaRPr lang="it-IT"/>
           </a:p>
@@ -4800,7 +4805,7 @@
           <a:p>
             <a:fld id="{DD268F46-A143-4D49-98F9-74B8259B3C7B}" type="datetimeFigureOut">
               <a:rPr lang="it-IT" smtClean="0"/>
-              <a:t>20/10/2020</a:t>
+              <a:t>21/10/2020</a:t>
             </a:fld>
             <a:endParaRPr lang="it-IT"/>
           </a:p>
@@ -4913,7 +4918,7 @@
           <a:p>
             <a:fld id="{DD268F46-A143-4D49-98F9-74B8259B3C7B}" type="datetimeFigureOut">
               <a:rPr lang="it-IT" smtClean="0"/>
-              <a:t>20/10/2020</a:t>
+              <a:t>21/10/2020</a:t>
             </a:fld>
             <a:endParaRPr lang="it-IT"/>
           </a:p>
@@ -5226,7 +5231,7 @@
           <a:p>
             <a:fld id="{DD268F46-A143-4D49-98F9-74B8259B3C7B}" type="datetimeFigureOut">
               <a:rPr lang="it-IT" smtClean="0"/>
-              <a:t>20/10/2020</a:t>
+              <a:t>21/10/2020</a:t>
             </a:fld>
             <a:endParaRPr lang="it-IT"/>
           </a:p>
@@ -5515,7 +5520,7 @@
           <a:p>
             <a:fld id="{DD268F46-A143-4D49-98F9-74B8259B3C7B}" type="datetimeFigureOut">
               <a:rPr lang="it-IT" smtClean="0"/>
-              <a:t>20/10/2020</a:t>
+              <a:t>21/10/2020</a:t>
             </a:fld>
             <a:endParaRPr lang="it-IT"/>
           </a:p>
@@ -5758,7 +5763,7 @@
           <a:p>
             <a:fld id="{DD268F46-A143-4D49-98F9-74B8259B3C7B}" type="datetimeFigureOut">
               <a:rPr lang="it-IT" smtClean="0"/>
-              <a:t>20/10/2020</a:t>
+              <a:t>21/10/2020</a:t>
             </a:fld>
             <a:endParaRPr lang="it-IT"/>
           </a:p>
@@ -10916,8 +10921,8 @@
           </a:prstGeom>
         </p:spPr>
       </p:pic>
-      <mc:AlternateContent xmlns:mc="http://schemas.openxmlformats.org/markup-compatibility/2006">
-        <mc:Choice xmlns:p14="http://schemas.microsoft.com/office/powerpoint/2010/main" Requires="p14">
+      <mc:AlternateContent xmlns:mc="http://schemas.openxmlformats.org/markup-compatibility/2006" xmlns:p14="http://schemas.microsoft.com/office/powerpoint/2010/main">
+        <mc:Choice Requires="p14">
           <p:contentPart p14:bwMode="auto" r:id="rId3">
             <p14:nvContentPartPr>
               <p14:cNvPr id="6" name="Ink 5">
@@ -10936,7 +10941,7 @@
             </p14:xfrm>
           </p:contentPart>
         </mc:Choice>
-        <mc:Fallback>
+        <mc:Fallback xmlns="">
           <p:pic>
             <p:nvPicPr>
               <p:cNvPr id="6" name="Ink 5">
@@ -10967,8 +10972,8 @@
           </p:pic>
         </mc:Fallback>
       </mc:AlternateContent>
-      <mc:AlternateContent xmlns:mc="http://schemas.openxmlformats.org/markup-compatibility/2006">
-        <mc:Choice xmlns:p14="http://schemas.microsoft.com/office/powerpoint/2010/main" Requires="p14">
+      <mc:AlternateContent xmlns:mc="http://schemas.openxmlformats.org/markup-compatibility/2006" xmlns:p14="http://schemas.microsoft.com/office/powerpoint/2010/main">
+        <mc:Choice Requires="p14">
           <p:contentPart p14:bwMode="auto" r:id="rId5">
             <p14:nvContentPartPr>
               <p14:cNvPr id="7" name="Ink 6">
@@ -10987,7 +10992,7 @@
             </p14:xfrm>
           </p:contentPart>
         </mc:Choice>
-        <mc:Fallback>
+        <mc:Fallback xmlns="">
           <p:pic>
             <p:nvPicPr>
               <p:cNvPr id="7" name="Ink 6">
@@ -11018,8 +11023,8 @@
           </p:pic>
         </mc:Fallback>
       </mc:AlternateContent>
-      <mc:AlternateContent xmlns:mc="http://schemas.openxmlformats.org/markup-compatibility/2006">
-        <mc:Choice xmlns:p14="http://schemas.microsoft.com/office/powerpoint/2010/main" Requires="p14">
+      <mc:AlternateContent xmlns:mc="http://schemas.openxmlformats.org/markup-compatibility/2006" xmlns:p14="http://schemas.microsoft.com/office/powerpoint/2010/main">
+        <mc:Choice Requires="p14">
           <p:contentPart p14:bwMode="auto" r:id="rId7">
             <p14:nvContentPartPr>
               <p14:cNvPr id="8" name="Ink 7">
@@ -11038,7 +11043,7 @@
             </p14:xfrm>
           </p:contentPart>
         </mc:Choice>
-        <mc:Fallback>
+        <mc:Fallback xmlns="">
           <p:pic>
             <p:nvPicPr>
               <p:cNvPr id="8" name="Ink 7">
@@ -11069,8 +11074,8 @@
           </p:pic>
         </mc:Fallback>
       </mc:AlternateContent>
-      <mc:AlternateContent xmlns:mc="http://schemas.openxmlformats.org/markup-compatibility/2006">
-        <mc:Choice xmlns:p14="http://schemas.microsoft.com/office/powerpoint/2010/main" Requires="p14">
+      <mc:AlternateContent xmlns:mc="http://schemas.openxmlformats.org/markup-compatibility/2006" xmlns:p14="http://schemas.microsoft.com/office/powerpoint/2010/main">
+        <mc:Choice Requires="p14">
           <p:contentPart p14:bwMode="auto" r:id="rId8">
             <p14:nvContentPartPr>
               <p14:cNvPr id="9" name="Ink 8">
@@ -11089,7 +11094,7 @@
             </p14:xfrm>
           </p:contentPart>
         </mc:Choice>
-        <mc:Fallback>
+        <mc:Fallback xmlns="">
           <p:pic>
             <p:nvPicPr>
               <p:cNvPr id="9" name="Ink 8">
@@ -11558,6 +11563,81 @@
   <p:clrMapOvr>
     <a:masterClrMapping/>
   </p:clrMapOvr>
+  <p:timing>
+    <p:tnLst>
+      <p:par>
+        <p:cTn id="1" dur="indefinite" restart="never" nodeType="tmRoot">
+          <p:childTnLst>
+            <p:seq concurrent="1" nextAc="seek">
+              <p:cTn id="2" dur="indefinite" nodeType="mainSeq">
+                <p:childTnLst>
+                  <p:par>
+                    <p:cTn id="3" fill="hold">
+                      <p:stCondLst>
+                        <p:cond delay="indefinite"/>
+                      </p:stCondLst>
+                      <p:childTnLst>
+                        <p:par>
+                          <p:cTn id="4" fill="hold">
+                            <p:stCondLst>
+                              <p:cond delay="0"/>
+                            </p:stCondLst>
+                            <p:childTnLst>
+                              <p:par>
+                                <p:cTn id="5" presetID="1" presetClass="entr" presetSubtype="0" fill="hold" nodeType="clickEffect">
+                                  <p:stCondLst>
+                                    <p:cond delay="0"/>
+                                  </p:stCondLst>
+                                  <p:childTnLst>
+                                    <p:set>
+                                      <p:cBhvr>
+                                        <p:cTn id="6" dur="1" fill="hold">
+                                          <p:stCondLst>
+                                            <p:cond delay="0"/>
+                                          </p:stCondLst>
+                                        </p:cTn>
+                                        <p:tgtEl>
+                                          <p:spTgt spid="7"/>
+                                        </p:tgtEl>
+                                        <p:attrNameLst>
+                                          <p:attrName>style.visibility</p:attrName>
+                                        </p:attrNameLst>
+                                      </p:cBhvr>
+                                      <p:to>
+                                        <p:strVal val="visible"/>
+                                      </p:to>
+                                    </p:set>
+                                  </p:childTnLst>
+                                </p:cTn>
+                              </p:par>
+                            </p:childTnLst>
+                          </p:cTn>
+                        </p:par>
+                      </p:childTnLst>
+                    </p:cTn>
+                  </p:par>
+                </p:childTnLst>
+              </p:cTn>
+              <p:prevCondLst>
+                <p:cond evt="onPrev" delay="0">
+                  <p:tgtEl>
+                    <p:sldTgt/>
+                  </p:tgtEl>
+                </p:cond>
+              </p:prevCondLst>
+              <p:nextCondLst>
+                <p:cond evt="onNext" delay="0">
+                  <p:tgtEl>
+                    <p:sldTgt/>
+                  </p:tgtEl>
+                </p:cond>
+              </p:nextCondLst>
+            </p:seq>
+          </p:childTnLst>
+        </p:cTn>
+      </p:par>
+    </p:tnLst>
+  </p:timing>
 </p:sld>
 </file>
 

</xml_diff>